<commit_message>
changes to second half of semester etc
</commit_message>
<xml_diff>
--- a/lectures/Prisoners dilemma.pptx
+++ b/lectures/Prisoners dilemma.pptx
@@ -242,7 +242,7 @@
             <a:fld id="{353FB7D0-3F83-5B4A-9D51-DB191047E9A5}" type="datetimeFigureOut">
               <a:rPr lang="en-US" smtClean="0"/>
               <a:pPr/>
-              <a:t>9/21/19</a:t>
+              <a:t>10/10/19</a:t>
             </a:fld>
             <a:endParaRPr lang="en-US"/>
           </a:p>
@@ -3370,7 +3370,7 @@
             <a:fld id="{3224E3AE-F06B-384D-80BE-EAB0031E84E9}" type="datetimeFigureOut">
               <a:rPr lang="en-US" smtClean="0"/>
               <a:pPr/>
-              <a:t>9/21/19</a:t>
+              <a:t>10/10/19</a:t>
             </a:fld>
             <a:endParaRPr lang="en-US"/>
           </a:p>
@@ -3554,7 +3554,7 @@
             <a:fld id="{3224E3AE-F06B-384D-80BE-EAB0031E84E9}" type="datetimeFigureOut">
               <a:rPr lang="en-US" smtClean="0"/>
               <a:pPr/>
-              <a:t>9/21/19</a:t>
+              <a:t>10/10/19</a:t>
             </a:fld>
             <a:endParaRPr lang="en-US"/>
           </a:p>
@@ -3730,7 +3730,7 @@
             <a:fld id="{3224E3AE-F06B-384D-80BE-EAB0031E84E9}" type="datetimeFigureOut">
               <a:rPr lang="en-US" smtClean="0"/>
               <a:pPr/>
-              <a:t>9/21/19</a:t>
+              <a:t>10/10/19</a:t>
             </a:fld>
             <a:endParaRPr lang="en-US"/>
           </a:p>
@@ -3896,7 +3896,7 @@
             <a:fld id="{3224E3AE-F06B-384D-80BE-EAB0031E84E9}" type="datetimeFigureOut">
               <a:rPr lang="en-US" smtClean="0"/>
               <a:pPr/>
-              <a:t>9/21/19</a:t>
+              <a:t>10/10/19</a:t>
             </a:fld>
             <a:endParaRPr lang="en-US"/>
           </a:p>
@@ -4118,7 +4118,7 @@
             <a:fld id="{C3F416CD-67A3-4CF0-A210-F6AF31AC147F}" type="datetimeFigureOut">
               <a:rPr lang="en-US" smtClean="0"/>
               <a:pPr/>
-              <a:t>9/21/19</a:t>
+              <a:t>10/10/19</a:t>
             </a:fld>
             <a:endParaRPr lang="en-US"/>
           </a:p>
@@ -4378,7 +4378,7 @@
             <a:fld id="{3224E3AE-F06B-384D-80BE-EAB0031E84E9}" type="datetimeFigureOut">
               <a:rPr lang="en-US" smtClean="0"/>
               <a:pPr/>
-              <a:t>9/21/19</a:t>
+              <a:t>10/10/19</a:t>
             </a:fld>
             <a:endParaRPr lang="en-US"/>
           </a:p>
@@ -4783,7 +4783,7 @@
             <a:fld id="{3224E3AE-F06B-384D-80BE-EAB0031E84E9}" type="datetimeFigureOut">
               <a:rPr lang="en-US" smtClean="0"/>
               <a:pPr/>
-              <a:t>9/21/19</a:t>
+              <a:t>10/10/19</a:t>
             </a:fld>
             <a:endParaRPr lang="en-US"/>
           </a:p>
@@ -4915,7 +4915,7 @@
             <a:fld id="{3224E3AE-F06B-384D-80BE-EAB0031E84E9}" type="datetimeFigureOut">
               <a:rPr lang="en-US" smtClean="0"/>
               <a:pPr/>
-              <a:t>9/21/19</a:t>
+              <a:t>10/10/19</a:t>
             </a:fld>
             <a:endParaRPr lang="en-US"/>
           </a:p>
@@ -5017,7 +5017,7 @@
             <a:fld id="{3224E3AE-F06B-384D-80BE-EAB0031E84E9}" type="datetimeFigureOut">
               <a:rPr lang="en-US" smtClean="0"/>
               <a:pPr/>
-              <a:t>9/21/19</a:t>
+              <a:t>10/10/19</a:t>
             </a:fld>
             <a:endParaRPr lang="en-US"/>
           </a:p>
@@ -5263,7 +5263,7 @@
             <a:fld id="{3224E3AE-F06B-384D-80BE-EAB0031E84E9}" type="datetimeFigureOut">
               <a:rPr lang="en-US" smtClean="0"/>
               <a:pPr/>
-              <a:t>9/21/19</a:t>
+              <a:t>10/10/19</a:t>
             </a:fld>
             <a:endParaRPr lang="en-US"/>
           </a:p>
@@ -5508,7 +5508,7 @@
             <a:fld id="{3224E3AE-F06B-384D-80BE-EAB0031E84E9}" type="datetimeFigureOut">
               <a:rPr lang="en-US" smtClean="0"/>
               <a:pPr/>
-              <a:t>9/21/19</a:t>
+              <a:t>10/10/19</a:t>
             </a:fld>
             <a:endParaRPr lang="en-US"/>
           </a:p>
@@ -6332,7 +6332,7 @@
             <a:fld id="{3224E3AE-F06B-384D-80BE-EAB0031E84E9}" type="datetimeFigureOut">
               <a:rPr lang="en-US" smtClean="0"/>
               <a:pPr/>
-              <a:t>9/21/19</a:t>
+              <a:t>10/10/19</a:t>
             </a:fld>
             <a:endParaRPr lang="en-US"/>
           </a:p>
@@ -8685,10 +8685,10 @@
         </p:nvGrpSpPr>
         <p:grpSpPr>
           <a:xfrm>
-            <a:off x="868208" y="1344038"/>
-            <a:ext cx="7197028" cy="3371334"/>
-            <a:chOff x="868208" y="1344038"/>
-            <a:chExt cx="7197028" cy="3371334"/>
+            <a:off x="1474133" y="1344038"/>
+            <a:ext cx="6591103" cy="3371334"/>
+            <a:chOff x="1474133" y="1344038"/>
+            <a:chExt cx="6591103" cy="3371334"/>
           </a:xfrm>
         </p:grpSpPr>
         <p:cxnSp>
@@ -9010,7 +9010,7 @@
           </p:nvSpPr>
           <p:spPr>
             <a:xfrm rot="16200000">
-              <a:off x="107743" y="2626498"/>
+              <a:off x="713668" y="2986467"/>
               <a:ext cx="1890261" cy="369332"/>
             </a:xfrm>
             <a:prstGeom prst="rect">
@@ -9130,7 +9130,7 @@
           </p:nvSpPr>
           <p:spPr>
             <a:xfrm>
-              <a:off x="1709010" y="2701724"/>
+              <a:off x="1709010" y="2771806"/>
               <a:ext cx="431528" cy="523220"/>
             </a:xfrm>
             <a:prstGeom prst="rect">

</xml_diff>

<commit_message>
rational traps first draft posting
</commit_message>
<xml_diff>
--- a/lectures/Prisoners dilemma.pptx
+++ b/lectures/Prisoners dilemma.pptx
@@ -242,7 +242,7 @@
             <a:fld id="{353FB7D0-3F83-5B4A-9D51-DB191047E9A5}" type="datetimeFigureOut">
               <a:rPr lang="en-US" smtClean="0"/>
               <a:pPr/>
-              <a:t>10/10/19</a:t>
+              <a:t>1/25/20</a:t>
             </a:fld>
             <a:endParaRPr lang="en-US"/>
           </a:p>
@@ -3370,7 +3370,7 @@
             <a:fld id="{3224E3AE-F06B-384D-80BE-EAB0031E84E9}" type="datetimeFigureOut">
               <a:rPr lang="en-US" smtClean="0"/>
               <a:pPr/>
-              <a:t>10/10/19</a:t>
+              <a:t>1/25/20</a:t>
             </a:fld>
             <a:endParaRPr lang="en-US"/>
           </a:p>
@@ -3554,7 +3554,7 @@
             <a:fld id="{3224E3AE-F06B-384D-80BE-EAB0031E84E9}" type="datetimeFigureOut">
               <a:rPr lang="en-US" smtClean="0"/>
               <a:pPr/>
-              <a:t>10/10/19</a:t>
+              <a:t>1/25/20</a:t>
             </a:fld>
             <a:endParaRPr lang="en-US"/>
           </a:p>
@@ -3730,7 +3730,7 @@
             <a:fld id="{3224E3AE-F06B-384D-80BE-EAB0031E84E9}" type="datetimeFigureOut">
               <a:rPr lang="en-US" smtClean="0"/>
               <a:pPr/>
-              <a:t>10/10/19</a:t>
+              <a:t>1/25/20</a:t>
             </a:fld>
             <a:endParaRPr lang="en-US"/>
           </a:p>
@@ -3896,7 +3896,7 @@
             <a:fld id="{3224E3AE-F06B-384D-80BE-EAB0031E84E9}" type="datetimeFigureOut">
               <a:rPr lang="en-US" smtClean="0"/>
               <a:pPr/>
-              <a:t>10/10/19</a:t>
+              <a:t>1/25/20</a:t>
             </a:fld>
             <a:endParaRPr lang="en-US"/>
           </a:p>
@@ -4118,7 +4118,7 @@
             <a:fld id="{C3F416CD-67A3-4CF0-A210-F6AF31AC147F}" type="datetimeFigureOut">
               <a:rPr lang="en-US" smtClean="0"/>
               <a:pPr/>
-              <a:t>10/10/19</a:t>
+              <a:t>1/25/20</a:t>
             </a:fld>
             <a:endParaRPr lang="en-US"/>
           </a:p>
@@ -4378,7 +4378,7 @@
             <a:fld id="{3224E3AE-F06B-384D-80BE-EAB0031E84E9}" type="datetimeFigureOut">
               <a:rPr lang="en-US" smtClean="0"/>
               <a:pPr/>
-              <a:t>10/10/19</a:t>
+              <a:t>1/25/20</a:t>
             </a:fld>
             <a:endParaRPr lang="en-US"/>
           </a:p>
@@ -4783,7 +4783,7 @@
             <a:fld id="{3224E3AE-F06B-384D-80BE-EAB0031E84E9}" type="datetimeFigureOut">
               <a:rPr lang="en-US" smtClean="0"/>
               <a:pPr/>
-              <a:t>10/10/19</a:t>
+              <a:t>1/25/20</a:t>
             </a:fld>
             <a:endParaRPr lang="en-US"/>
           </a:p>
@@ -4915,7 +4915,7 @@
             <a:fld id="{3224E3AE-F06B-384D-80BE-EAB0031E84E9}" type="datetimeFigureOut">
               <a:rPr lang="en-US" smtClean="0"/>
               <a:pPr/>
-              <a:t>10/10/19</a:t>
+              <a:t>1/25/20</a:t>
             </a:fld>
             <a:endParaRPr lang="en-US"/>
           </a:p>
@@ -5017,7 +5017,7 @@
             <a:fld id="{3224E3AE-F06B-384D-80BE-EAB0031E84E9}" type="datetimeFigureOut">
               <a:rPr lang="en-US" smtClean="0"/>
               <a:pPr/>
-              <a:t>10/10/19</a:t>
+              <a:t>1/25/20</a:t>
             </a:fld>
             <a:endParaRPr lang="en-US"/>
           </a:p>
@@ -5263,7 +5263,7 @@
             <a:fld id="{3224E3AE-F06B-384D-80BE-EAB0031E84E9}" type="datetimeFigureOut">
               <a:rPr lang="en-US" smtClean="0"/>
               <a:pPr/>
-              <a:t>10/10/19</a:t>
+              <a:t>1/25/20</a:t>
             </a:fld>
             <a:endParaRPr lang="en-US"/>
           </a:p>
@@ -5508,7 +5508,7 @@
             <a:fld id="{3224E3AE-F06B-384D-80BE-EAB0031E84E9}" type="datetimeFigureOut">
               <a:rPr lang="en-US" smtClean="0"/>
               <a:pPr/>
-              <a:t>10/10/19</a:t>
+              <a:t>1/25/20</a:t>
             </a:fld>
             <a:endParaRPr lang="en-US"/>
           </a:p>
@@ -6332,7 +6332,7 @@
             <a:fld id="{3224E3AE-F06B-384D-80BE-EAB0031E84E9}" type="datetimeFigureOut">
               <a:rPr lang="en-US" smtClean="0"/>
               <a:pPr/>
-              <a:t>10/10/19</a:t>
+              <a:t>1/25/20</a:t>
             </a:fld>
             <a:endParaRPr lang="en-US"/>
           </a:p>
@@ -10370,11 +10370,17 @@
           <p:cNvGraphicFramePr>
             <a:graphicFrameLocks noGrp="1"/>
           </p:cNvGraphicFramePr>
-          <p:nvPr/>
+          <p:nvPr>
+            <p:extLst>
+              <p:ext uri="{D42A27DB-BD31-4B8C-83A1-F6EECF244321}">
+                <p14:modId xmlns:p14="http://schemas.microsoft.com/office/powerpoint/2010/main" val="743035953"/>
+              </p:ext>
+            </p:extLst>
+          </p:nvPr>
         </p:nvGraphicFramePr>
         <p:xfrm>
           <a:off x="609600" y="1397000"/>
-          <a:ext cx="8001000" cy="4269544"/>
+          <a:ext cx="8001000" cy="4543865"/>
         </p:xfrm>
         <a:graphic>
           <a:graphicData uri="http://schemas.openxmlformats.org/drawingml/2006/table">
@@ -11562,11 +11568,17 @@
           <p:cNvGraphicFramePr>
             <a:graphicFrameLocks noGrp="1"/>
           </p:cNvGraphicFramePr>
-          <p:nvPr/>
+          <p:nvPr>
+            <p:extLst>
+              <p:ext uri="{D42A27DB-BD31-4B8C-83A1-F6EECF244321}">
+                <p14:modId xmlns:p14="http://schemas.microsoft.com/office/powerpoint/2010/main" val="1342826935"/>
+              </p:ext>
+            </p:extLst>
+          </p:nvPr>
         </p:nvGraphicFramePr>
         <p:xfrm>
           <a:off x="609600" y="1397000"/>
-          <a:ext cx="8001000" cy="3997569"/>
+          <a:ext cx="8001000" cy="3997570"/>
         </p:xfrm>
         <a:graphic>
           <a:graphicData uri="http://schemas.openxmlformats.org/drawingml/2006/table">
@@ -12356,7 +12368,7 @@
         </p:nvGraphicFramePr>
         <p:xfrm>
           <a:off x="609600" y="1397000"/>
-          <a:ext cx="8001000" cy="3997569"/>
+          <a:ext cx="8001000" cy="3997570"/>
         </p:xfrm>
         <a:graphic>
           <a:graphicData uri="http://schemas.openxmlformats.org/drawingml/2006/table">
@@ -13683,7 +13695,7 @@
         </p:nvGraphicFramePr>
         <p:xfrm>
           <a:off x="609600" y="1397000"/>
-          <a:ext cx="8001000" cy="3997569"/>
+          <a:ext cx="8001000" cy="3997570"/>
         </p:xfrm>
         <a:graphic>
           <a:graphicData uri="http://schemas.openxmlformats.org/drawingml/2006/table">

</xml_diff>